<commit_message>
feat: 🎸 update the final session of nest.js 10
</commit_message>
<xml_diff>
--- a/nestjs/nestjs-10.pptx
+++ b/nestjs/nestjs-10.pptx
@@ -5,7 +5,7 @@
     <p:sldMasterId id="2147483705" r:id="rId1"/>
   </p:sldMasterIdLst>
   <p:notesMasterIdLst>
-    <p:notesMasterId r:id="rId14"/>
+    <p:notesMasterId r:id="rId18"/>
   </p:notesMasterIdLst>
   <p:sldIdLst>
     <p:sldId id="259" r:id="rId2"/>
@@ -17,9 +17,13 @@
     <p:sldId id="338" r:id="rId8"/>
     <p:sldId id="339" r:id="rId9"/>
     <p:sldId id="334" r:id="rId10"/>
-    <p:sldId id="335" r:id="rId11"/>
-    <p:sldId id="336" r:id="rId12"/>
-    <p:sldId id="320" r:id="rId13"/>
+    <p:sldId id="340" r:id="rId11"/>
+    <p:sldId id="335" r:id="rId12"/>
+    <p:sldId id="336" r:id="rId13"/>
+    <p:sldId id="341" r:id="rId14"/>
+    <p:sldId id="342" r:id="rId15"/>
+    <p:sldId id="343" r:id="rId16"/>
+    <p:sldId id="320" r:id="rId17"/>
   </p:sldIdLst>
   <p:sldSz cx="12192000" cy="6858000"/>
   <p:notesSz cx="6858000" cy="9144000"/>
@@ -767,7 +771,7 @@
           <a:p>
             <a:fld id="{0FE84E6F-3671-472C-BE6F-A37BC298F4AB}" type="slidenum">
               <a:rPr lang="en-US" smtClean="0"/>
-              <a:t>12</a:t>
+              <a:t>16</a:t>
             </a:fld>
             <a:endParaRPr lang="en-US"/>
           </a:p>
@@ -6974,7 +6978,7 @@
           <a:p>
             <a:r>
               <a:rPr lang="en-US" sz="2800" dirty="0"/>
-              <a:t>09 – Authentication</a:t>
+              <a:t>10 – Authentication</a:t>
             </a:r>
           </a:p>
         </p:txBody>
@@ -7014,7 +7018,7 @@
           <p:cNvPr id="2" name="Title 1">
             <a:extLst>
               <a:ext uri="{FF2B5EF4-FFF2-40B4-BE49-F238E27FC236}">
-                <a16:creationId xmlns:a16="http://schemas.microsoft.com/office/drawing/2014/main" id="{BEE1017D-9834-4BBD-92ED-0B3253B751CF}"/>
+                <a16:creationId xmlns:a16="http://schemas.microsoft.com/office/drawing/2014/main" id="{0A8B61B6-63EA-4BD7-8054-67D94A25DA5A}"/>
               </a:ext>
             </a:extLst>
           </p:cNvPr>
@@ -7032,8 +7036,9 @@
           <a:p>
             <a:r>
               <a:rPr lang="en-US" dirty="0"/>
-              <a:t>Demo</a:t>
-            </a:r>
+              <a:t>Session Summary</a:t>
+            </a:r>
+            <a:endParaRPr lang="fa-IR" dirty="0"/>
           </a:p>
         </p:txBody>
       </p:sp>
@@ -7042,7 +7047,7 @@
           <p:cNvPr id="3" name="Content Placeholder 2">
             <a:extLst>
               <a:ext uri="{FF2B5EF4-FFF2-40B4-BE49-F238E27FC236}">
-                <a16:creationId xmlns:a16="http://schemas.microsoft.com/office/drawing/2014/main" id="{9EBECA0F-1755-483B-9774-0270CA892BE1}"/>
+                <a16:creationId xmlns:a16="http://schemas.microsoft.com/office/drawing/2014/main" id="{6F2591A0-68D8-469C-9DF5-DBD57A36EE61}"/>
               </a:ext>
             </a:extLst>
           </p:cNvPr>
@@ -7060,120 +7065,53 @@
           <a:p>
             <a:r>
               <a:rPr lang="en-US" dirty="0"/>
-              <a:t>Tokens:</a:t>
+              <a:t>You have to implement these stuff:</a:t>
             </a:r>
           </a:p>
           <a:p>
             <a:pPr lvl="1"/>
             <a:r>
               <a:rPr lang="en-US" dirty="0"/>
-              <a:t>On login route, return the JWT access token</a:t>
+              <a:t>Use session inside main.ts</a:t>
             </a:r>
           </a:p>
           <a:p>
             <a:pPr lvl="1"/>
             <a:r>
               <a:rPr lang="en-US" dirty="0"/>
-              <a:t>On protected route, require a Bearer Auth token</a:t>
-            </a:r>
+              <a:t>Create a </a:t>
+            </a:r>
+            <a:r>
+              <a:rPr lang="en-US" dirty="0" err="1"/>
+              <a:t>SessionSerializer</a:t>
+            </a:r>
+            <a:endParaRPr lang="en-US" dirty="0"/>
           </a:p>
           <a:p>
             <a:pPr lvl="1"/>
             <a:r>
+              <a:rPr lang="en-US" dirty="0"/>
+              <a:t>Create a simple login auth guard to call login() method</a:t>
+            </a:r>
+          </a:p>
+          <a:p>
+            <a:pPr lvl="1"/>
+            <a:r>
+              <a:rPr lang="en-US" dirty="0"/>
+              <a:t>Create a guard to call </a:t>
+            </a:r>
+            <a:r>
               <a:rPr lang="en-US" dirty="0" err="1"/>
-              <a:t>npm</a:t>
-            </a:r>
-            <a:r>
-              <a:rPr lang="en-US" dirty="0"/>
-              <a:t> install @nestjs/jwt passport-</a:t>
-            </a:r>
-            <a:r>
-              <a:rPr lang="en-US" dirty="0" err="1"/>
-              <a:t>jwt</a:t>
-            </a:r>
-            <a:endParaRPr lang="en-US" dirty="0"/>
+              <a:t>request.isAuthenticated</a:t>
+            </a:r>
+            <a:r>
+              <a:rPr lang="en-US" dirty="0"/>
+              <a:t>()</a:t>
+            </a:r>
           </a:p>
           <a:p>
             <a:pPr lvl="1"/>
-            <a:r>
-              <a:rPr lang="en-US" dirty="0"/>
-              <a:t>In </a:t>
-            </a:r>
-            <a:r>
-              <a:rPr lang="en-US" dirty="0" err="1"/>
-              <a:t>AuthService</a:t>
-            </a:r>
-            <a:r>
-              <a:rPr lang="en-US" dirty="0"/>
-              <a:t>, use </a:t>
-            </a:r>
-            <a:r>
-              <a:rPr lang="en-US" dirty="0" err="1"/>
-              <a:t>JwtService</a:t>
-            </a:r>
-            <a:r>
-              <a:rPr lang="en-US" dirty="0"/>
-              <a:t> to create JWT token (signing)</a:t>
-            </a:r>
-          </a:p>
-          <a:p>
-            <a:pPr lvl="2"/>
-            <a:r>
-              <a:rPr lang="en-US" dirty="0"/>
-              <a:t>Login method for signing JWT token</a:t>
-            </a:r>
-          </a:p>
-          <a:p>
-            <a:pPr lvl="1"/>
-            <a:r>
-              <a:rPr lang="en-US" dirty="0"/>
-              <a:t>Import </a:t>
-            </a:r>
-            <a:r>
-              <a:rPr lang="en-US" dirty="0" err="1"/>
-              <a:t>JwtModule</a:t>
-            </a:r>
-            <a:r>
-              <a:rPr lang="en-US" dirty="0"/>
-              <a:t> (by register function, secret, </a:t>
-            </a:r>
-            <a:r>
-              <a:rPr lang="en-US" dirty="0" err="1"/>
-              <a:t>expiresIn</a:t>
-            </a:r>
-            <a:r>
-              <a:rPr lang="en-US" dirty="0"/>
-              <a:t> ?)</a:t>
-            </a:r>
-          </a:p>
-          <a:p>
-            <a:pPr lvl="2"/>
-            <a:r>
-              <a:rPr lang="en-US" dirty="0"/>
-              <a:t>Secret is so important, don’t expose it to anybody</a:t>
-            </a:r>
-          </a:p>
-          <a:p>
-            <a:pPr lvl="1"/>
-            <a:r>
-              <a:rPr lang="en-US" dirty="0"/>
-              <a:t>Check your JWT token in </a:t>
-            </a:r>
-            <a:r>
-              <a:rPr lang="en-US" dirty="0">
-                <a:hlinkClick r:id="rId2"/>
-              </a:rPr>
-              <a:t>https://jwt.io</a:t>
-            </a:r>
             <a:endParaRPr lang="fa-IR" dirty="0"/>
-          </a:p>
-          <a:p>
-            <a:pPr lvl="1"/>
-            <a:endParaRPr lang="en-US" dirty="0"/>
-          </a:p>
-          <a:p>
-            <a:pPr lvl="2"/>
-            <a:endParaRPr lang="en-US" dirty="0"/>
           </a:p>
         </p:txBody>
       </p:sp>
@@ -7182,7 +7120,7 @@
           <p:cNvPr id="4" name="Footer Placeholder 3">
             <a:extLst>
               <a:ext uri="{FF2B5EF4-FFF2-40B4-BE49-F238E27FC236}">
-                <a16:creationId xmlns:a16="http://schemas.microsoft.com/office/drawing/2014/main" id="{FD5970F7-0477-4F5C-B6D2-396794BDF69D}"/>
+                <a16:creationId xmlns:a16="http://schemas.microsoft.com/office/drawing/2014/main" id="{84EE77FF-C9AB-4E30-8F7E-62A759611C35}"/>
               </a:ext>
             </a:extLst>
           </p:cNvPr>
@@ -7211,7 +7149,7 @@
           <p:cNvPr id="5" name="Slide Number Placeholder 4">
             <a:extLst>
               <a:ext uri="{FF2B5EF4-FFF2-40B4-BE49-F238E27FC236}">
-                <a16:creationId xmlns:a16="http://schemas.microsoft.com/office/drawing/2014/main" id="{760445EB-99E2-44AA-A59D-321B336CEEED}"/>
+                <a16:creationId xmlns:a16="http://schemas.microsoft.com/office/drawing/2014/main" id="{8175F22A-64CC-4983-A2A3-60DE049C95E4}"/>
               </a:ext>
             </a:extLst>
           </p:cNvPr>
@@ -7238,7 +7176,7 @@
     </p:spTree>
     <p:extLst>
       <p:ext uri="{BB962C8B-B14F-4D97-AF65-F5344CB8AC3E}">
-        <p14:creationId xmlns:p14="http://schemas.microsoft.com/office/powerpoint/2010/main" val="880073590"/>
+        <p14:creationId xmlns:p14="http://schemas.microsoft.com/office/powerpoint/2010/main" val="3799100899"/>
       </p:ext>
     </p:extLst>
   </p:cSld>
@@ -7270,7 +7208,7 @@
           <p:cNvPr id="2" name="Title 1">
             <a:extLst>
               <a:ext uri="{FF2B5EF4-FFF2-40B4-BE49-F238E27FC236}">
-                <a16:creationId xmlns:a16="http://schemas.microsoft.com/office/drawing/2014/main" id="{7098622B-9971-4765-AB05-47BF069018F0}"/>
+                <a16:creationId xmlns:a16="http://schemas.microsoft.com/office/drawing/2014/main" id="{BEE1017D-9834-4BBD-92ED-0B3253B751CF}"/>
               </a:ext>
             </a:extLst>
           </p:cNvPr>
@@ -7298,7 +7236,7 @@
           <p:cNvPr id="3" name="Content Placeholder 2">
             <a:extLst>
               <a:ext uri="{FF2B5EF4-FFF2-40B4-BE49-F238E27FC236}">
-                <a16:creationId xmlns:a16="http://schemas.microsoft.com/office/drawing/2014/main" id="{A2182DCB-2865-4DC8-83D9-5E1726D7892E}"/>
+                <a16:creationId xmlns:a16="http://schemas.microsoft.com/office/drawing/2014/main" id="{9EBECA0F-1755-483B-9774-0270CA892BE1}"/>
               </a:ext>
             </a:extLst>
           </p:cNvPr>
@@ -7312,127 +7250,166 @@
         <p:spPr/>
         <p:txBody>
           <a:bodyPr>
-            <a:normAutofit lnSpcReduction="10000"/>
+            <a:normAutofit/>
           </a:bodyPr>
           <a:lstStyle/>
           <a:p>
             <a:r>
               <a:rPr lang="en-US" dirty="0"/>
-              <a:t>Create your new strategy</a:t>
+              <a:t>Tokens:</a:t>
             </a:r>
           </a:p>
           <a:p>
             <a:pPr lvl="1"/>
             <a:r>
               <a:rPr lang="en-US" dirty="0"/>
-              <a:t>Extends </a:t>
+              <a:t>On login route, return the JWT access token</a:t>
+            </a:r>
+          </a:p>
+          <a:p>
+            <a:pPr lvl="1"/>
+            <a:r>
+              <a:rPr lang="en-US" dirty="0"/>
+              <a:t>On protected route, require a Bearer Auth token</a:t>
+            </a:r>
+          </a:p>
+          <a:p>
+            <a:pPr lvl="1"/>
+            <a:r>
+              <a:rPr lang="en-US" dirty="0" err="1">
+                <a:latin typeface="Consolas" panose="020B0609020204030204" pitchFamily="49" charset="0"/>
+              </a:rPr>
+              <a:t>npm</a:t>
+            </a:r>
+            <a:r>
+              <a:rPr lang="en-US" dirty="0">
+                <a:latin typeface="Consolas" panose="020B0609020204030204" pitchFamily="49" charset="0"/>
+              </a:rPr>
+              <a:t> install @nestjs/jwt passport-</a:t>
+            </a:r>
+            <a:r>
+              <a:rPr lang="en-US" dirty="0" err="1">
+                <a:latin typeface="Consolas" panose="020B0609020204030204" pitchFamily="49" charset="0"/>
+              </a:rPr>
+              <a:t>jwt</a:t>
+            </a:r>
+            <a:endParaRPr lang="en-US" dirty="0">
+              <a:latin typeface="Consolas" panose="020B0609020204030204" pitchFamily="49" charset="0"/>
+            </a:endParaRPr>
+          </a:p>
+          <a:p>
+            <a:pPr lvl="1"/>
+            <a:r>
+              <a:rPr lang="en-US" dirty="0" err="1">
+                <a:latin typeface="Consolas" panose="020B0609020204030204" pitchFamily="49" charset="0"/>
+              </a:rPr>
+              <a:t>npm</a:t>
+            </a:r>
+            <a:r>
+              <a:rPr lang="en-US" dirty="0">
+                <a:latin typeface="Consolas" panose="020B0609020204030204" pitchFamily="49" charset="0"/>
+              </a:rPr>
+              <a:t> </a:t>
+            </a:r>
+            <a:r>
+              <a:rPr lang="en-US" dirty="0" err="1">
+                <a:latin typeface="Consolas" panose="020B0609020204030204" pitchFamily="49" charset="0"/>
+              </a:rPr>
+              <a:t>i</a:t>
+            </a:r>
+            <a:r>
+              <a:rPr lang="en-US" dirty="0">
+                <a:latin typeface="Consolas" panose="020B0609020204030204" pitchFamily="49" charset="0"/>
+              </a:rPr>
+              <a:t> --save-dev @nestjs/jwt @types/passport-jwt</a:t>
+            </a:r>
+          </a:p>
+          <a:p>
+            <a:pPr lvl="1"/>
+            <a:r>
+              <a:rPr lang="en-US" dirty="0"/>
+              <a:t>In </a:t>
+            </a:r>
+            <a:r>
+              <a:rPr lang="en-US" dirty="0" err="1">
+                <a:latin typeface="Consolas" panose="020B0609020204030204" pitchFamily="49" charset="0"/>
+              </a:rPr>
+              <a:t>AuthService</a:t>
+            </a:r>
+            <a:r>
+              <a:rPr lang="en-US" dirty="0"/>
+              <a:t>, use </a:t>
+            </a:r>
+            <a:r>
+              <a:rPr lang="en-US" dirty="0" err="1">
+                <a:latin typeface="Consolas" panose="020B0609020204030204" pitchFamily="49" charset="0"/>
+              </a:rPr>
+              <a:t>JwtService</a:t>
+            </a:r>
+            <a:r>
+              <a:rPr lang="en-US" dirty="0"/>
+              <a:t> to create JWT token (signing)</a:t>
+            </a:r>
+          </a:p>
+          <a:p>
+            <a:pPr lvl="2"/>
+            <a:r>
+              <a:rPr lang="en-US" dirty="0"/>
+              <a:t>Login method for signing JWT token</a:t>
+            </a:r>
+          </a:p>
+          <a:p>
+            <a:pPr lvl="1"/>
+            <a:r>
+              <a:rPr lang="en-US" dirty="0"/>
+              <a:t>Import </a:t>
+            </a:r>
+            <a:r>
+              <a:rPr lang="en-US" dirty="0" err="1">
+                <a:latin typeface="Consolas" panose="020B0609020204030204" pitchFamily="49" charset="0"/>
+              </a:rPr>
+              <a:t>JwtModule</a:t>
+            </a:r>
+            <a:r>
+              <a:rPr lang="en-US" dirty="0"/>
+              <a:t> (by register function, secret, </a:t>
             </a:r>
             <a:r>
               <a:rPr lang="en-US" dirty="0" err="1"/>
-              <a:t>PassportStrategy</a:t>
-            </a:r>
-            <a:r>
-              <a:rPr lang="en-US" dirty="0"/>
-              <a:t>(‘</a:t>
-            </a:r>
-            <a:r>
-              <a:rPr lang="en-US" dirty="0" err="1"/>
-              <a:t>jwt</a:t>
-            </a:r>
-            <a:r>
-              <a:rPr lang="en-US" dirty="0"/>
-              <a:t>’)</a:t>
+              <a:t>expiresIn</a:t>
+            </a:r>
+            <a:r>
+              <a:rPr lang="en-US" dirty="0"/>
+              <a:t> ?)</a:t>
+            </a:r>
+          </a:p>
+          <a:p>
+            <a:pPr lvl="2"/>
+            <a:r>
+              <a:rPr lang="en-US" dirty="0"/>
+              <a:t>Secret is so important, don’t expose it to anybody</a:t>
             </a:r>
           </a:p>
           <a:p>
             <a:pPr lvl="1"/>
             <a:r>
               <a:rPr lang="en-US" dirty="0"/>
-              <a:t>Two step:</a:t>
-            </a:r>
+              <a:t>Check your JWT token in </a:t>
+            </a:r>
+            <a:r>
+              <a:rPr lang="en-US" dirty="0">
+                <a:hlinkClick r:id="rId2"/>
+              </a:rPr>
+              <a:t>https://jwt.io</a:t>
+            </a:r>
+            <a:endParaRPr lang="fa-IR" dirty="0"/>
+          </a:p>
+          <a:p>
+            <a:pPr lvl="1"/>
+            <a:endParaRPr lang="en-US" dirty="0"/>
           </a:p>
           <a:p>
             <a:pPr lvl="2"/>
-            <a:r>
-              <a:rPr lang="en-US" dirty="0"/>
-              <a:t>Configuration through constructor (super method)</a:t>
-            </a:r>
-          </a:p>
-          <a:p>
-            <a:pPr lvl="3"/>
-            <a:r>
-              <a:rPr lang="en-US" dirty="0" err="1"/>
-              <a:t>secretOrKey</a:t>
-            </a:r>
-            <a:endParaRPr lang="en-US" dirty="0"/>
-          </a:p>
-          <a:p>
-            <a:pPr lvl="3"/>
-            <a:r>
-              <a:rPr lang="en-US" dirty="0" err="1"/>
-              <a:t>ignoreExpiration</a:t>
-            </a:r>
-            <a:endParaRPr lang="en-US" dirty="0"/>
-          </a:p>
-          <a:p>
-            <a:pPr lvl="3"/>
-            <a:r>
-              <a:rPr lang="en-US" dirty="0"/>
-              <a:t>How to get that access token? </a:t>
-            </a:r>
-            <a:r>
-              <a:rPr lang="en-US" dirty="0" err="1"/>
-              <a:t>jwtFromRequest</a:t>
-            </a:r>
-            <a:r>
-              <a:rPr lang="en-US" dirty="0"/>
-              <a:t>: </a:t>
-            </a:r>
-            <a:r>
-              <a:rPr lang="en-US" dirty="0" err="1"/>
-              <a:t>ExtractJwt.fromAuthHeaderAsBearerToken</a:t>
-            </a:r>
-            <a:r>
-              <a:rPr lang="en-US" dirty="0"/>
-              <a:t>();</a:t>
-            </a:r>
-          </a:p>
-          <a:p>
-            <a:pPr lvl="2"/>
-            <a:r>
-              <a:rPr lang="en-US" dirty="0"/>
-              <a:t>Validation</a:t>
-            </a:r>
-          </a:p>
-          <a:p>
-            <a:pPr lvl="3"/>
-            <a:r>
-              <a:rPr lang="en-US" dirty="0"/>
-              <a:t>We have the payload (decrypted) here</a:t>
-            </a:r>
-          </a:p>
-          <a:p>
-            <a:pPr lvl="3"/>
-            <a:r>
-              <a:rPr lang="en-US" dirty="0"/>
-              <a:t>Return our user object, what you return in this function stored in </a:t>
-            </a:r>
-            <a:r>
-              <a:rPr lang="en-US" dirty="0" err="1"/>
-              <a:t>req.user</a:t>
-            </a:r>
-            <a:endParaRPr lang="en-US" dirty="0"/>
-          </a:p>
-          <a:p>
-            <a:pPr lvl="2"/>
-            <a:r>
-              <a:rPr lang="en-US" dirty="0"/>
-              <a:t>Don’t forget to provide you new </a:t>
-            </a:r>
-            <a:r>
-              <a:rPr lang="en-US" dirty="0" err="1"/>
-              <a:t>JwtStrategy</a:t>
-            </a:r>
             <a:endParaRPr lang="en-US" dirty="0"/>
           </a:p>
         </p:txBody>
@@ -7442,7 +7419,7 @@
           <p:cNvPr id="4" name="Footer Placeholder 3">
             <a:extLst>
               <a:ext uri="{FF2B5EF4-FFF2-40B4-BE49-F238E27FC236}">
-                <a16:creationId xmlns:a16="http://schemas.microsoft.com/office/drawing/2014/main" id="{FE3C4929-EAED-49AB-BB05-437E2B1FC331}"/>
+                <a16:creationId xmlns:a16="http://schemas.microsoft.com/office/drawing/2014/main" id="{FD5970F7-0477-4F5C-B6D2-396794BDF69D}"/>
               </a:ext>
             </a:extLst>
           </p:cNvPr>
@@ -7471,7 +7448,7 @@
           <p:cNvPr id="5" name="Slide Number Placeholder 4">
             <a:extLst>
               <a:ext uri="{FF2B5EF4-FFF2-40B4-BE49-F238E27FC236}">
-                <a16:creationId xmlns:a16="http://schemas.microsoft.com/office/drawing/2014/main" id="{6EDB6652-B25D-45BC-B7B0-49D958757C31}"/>
+                <a16:creationId xmlns:a16="http://schemas.microsoft.com/office/drawing/2014/main" id="{760445EB-99E2-44AA-A59D-321B336CEEED}"/>
               </a:ext>
             </a:extLst>
           </p:cNvPr>
@@ -7498,7 +7475,7 @@
     </p:spTree>
     <p:extLst>
       <p:ext uri="{BB962C8B-B14F-4D97-AF65-F5344CB8AC3E}">
-        <p14:creationId xmlns:p14="http://schemas.microsoft.com/office/powerpoint/2010/main" val="3161835212"/>
+        <p14:creationId xmlns:p14="http://schemas.microsoft.com/office/powerpoint/2010/main" val="880073590"/>
       </p:ext>
     </p:extLst>
   </p:cSld>
@@ -7530,6 +7507,894 @@
           <p:cNvPr id="2" name="Title 1">
             <a:extLst>
               <a:ext uri="{FF2B5EF4-FFF2-40B4-BE49-F238E27FC236}">
+                <a16:creationId xmlns:a16="http://schemas.microsoft.com/office/drawing/2014/main" id="{7098622B-9971-4765-AB05-47BF069018F0}"/>
+              </a:ext>
+            </a:extLst>
+          </p:cNvPr>
+          <p:cNvSpPr>
+            <a:spLocks noGrp="1"/>
+          </p:cNvSpPr>
+          <p:nvPr>
+            <p:ph type="title"/>
+          </p:nvPr>
+        </p:nvSpPr>
+        <p:spPr/>
+        <p:txBody>
+          <a:bodyPr/>
+          <a:lstStyle/>
+          <a:p>
+            <a:r>
+              <a:rPr lang="en-US" dirty="0"/>
+              <a:t>Demo</a:t>
+            </a:r>
+          </a:p>
+        </p:txBody>
+      </p:sp>
+      <p:sp>
+        <p:nvSpPr>
+          <p:cNvPr id="3" name="Content Placeholder 2">
+            <a:extLst>
+              <a:ext uri="{FF2B5EF4-FFF2-40B4-BE49-F238E27FC236}">
+                <a16:creationId xmlns:a16="http://schemas.microsoft.com/office/drawing/2014/main" id="{A2182DCB-2865-4DC8-83D9-5E1726D7892E}"/>
+              </a:ext>
+            </a:extLst>
+          </p:cNvPr>
+          <p:cNvSpPr>
+            <a:spLocks noGrp="1"/>
+          </p:cNvSpPr>
+          <p:nvPr>
+            <p:ph idx="1"/>
+          </p:nvPr>
+        </p:nvSpPr>
+        <p:spPr/>
+        <p:txBody>
+          <a:bodyPr>
+            <a:normAutofit fontScale="92500" lnSpcReduction="10000"/>
+          </a:bodyPr>
+          <a:lstStyle/>
+          <a:p>
+            <a:r>
+              <a:rPr lang="en-US" dirty="0"/>
+              <a:t>Create your new strategy</a:t>
+            </a:r>
+          </a:p>
+          <a:p>
+            <a:pPr lvl="1"/>
+            <a:r>
+              <a:rPr lang="en-US" dirty="0"/>
+              <a:t>Extends </a:t>
+            </a:r>
+            <a:r>
+              <a:rPr lang="en-US" dirty="0" err="1">
+                <a:latin typeface="Consolas" panose="020B0609020204030204" pitchFamily="49" charset="0"/>
+              </a:rPr>
+              <a:t>PassportStrategy</a:t>
+            </a:r>
+            <a:r>
+              <a:rPr lang="en-US" dirty="0">
+                <a:latin typeface="Consolas" panose="020B0609020204030204" pitchFamily="49" charset="0"/>
+              </a:rPr>
+              <a:t>(Strategy)</a:t>
+            </a:r>
+          </a:p>
+          <a:p>
+            <a:pPr lvl="1"/>
+            <a:r>
+              <a:rPr lang="en-US" dirty="0"/>
+              <a:t>Two step:</a:t>
+            </a:r>
+          </a:p>
+          <a:p>
+            <a:pPr lvl="2"/>
+            <a:r>
+              <a:rPr lang="en-US" dirty="0"/>
+              <a:t>Configuration through constructor (super method)</a:t>
+            </a:r>
+          </a:p>
+          <a:p>
+            <a:pPr lvl="3"/>
+            <a:r>
+              <a:rPr lang="en-US" sz="2100" dirty="0" err="1">
+                <a:latin typeface="Consolas" panose="020B0609020204030204" pitchFamily="49" charset="0"/>
+              </a:rPr>
+              <a:t>secretOrKey</a:t>
+            </a:r>
+            <a:endParaRPr lang="en-US" sz="2100" dirty="0">
+              <a:latin typeface="Consolas" panose="020B0609020204030204" pitchFamily="49" charset="0"/>
+            </a:endParaRPr>
+          </a:p>
+          <a:p>
+            <a:pPr lvl="3"/>
+            <a:r>
+              <a:rPr lang="en-US" sz="2100" dirty="0" err="1">
+                <a:latin typeface="Consolas" panose="020B0609020204030204" pitchFamily="49" charset="0"/>
+              </a:rPr>
+              <a:t>ignoreExpiration</a:t>
+            </a:r>
+            <a:endParaRPr lang="en-US" sz="2100" dirty="0">
+              <a:latin typeface="Consolas" panose="020B0609020204030204" pitchFamily="49" charset="0"/>
+            </a:endParaRPr>
+          </a:p>
+          <a:p>
+            <a:pPr lvl="3"/>
+            <a:r>
+              <a:rPr lang="en-US" dirty="0"/>
+              <a:t>How to get that access token? </a:t>
+            </a:r>
+            <a:r>
+              <a:rPr lang="en-US" sz="2100" dirty="0" err="1">
+                <a:latin typeface="Consolas" panose="020B0609020204030204" pitchFamily="49" charset="0"/>
+              </a:rPr>
+              <a:t>jwtFromRequest</a:t>
+            </a:r>
+            <a:r>
+              <a:rPr lang="en-US" sz="2100" dirty="0">
+                <a:latin typeface="Consolas" panose="020B0609020204030204" pitchFamily="49" charset="0"/>
+              </a:rPr>
+              <a:t>: </a:t>
+            </a:r>
+            <a:r>
+              <a:rPr lang="en-US" sz="2100" dirty="0" err="1">
+                <a:latin typeface="Consolas" panose="020B0609020204030204" pitchFamily="49" charset="0"/>
+              </a:rPr>
+              <a:t>ExtractJwt.fromAuthHeaderAsBearerToken</a:t>
+            </a:r>
+            <a:r>
+              <a:rPr lang="en-US" sz="2100" dirty="0">
+                <a:latin typeface="Consolas" panose="020B0609020204030204" pitchFamily="49" charset="0"/>
+              </a:rPr>
+              <a:t>();</a:t>
+            </a:r>
+          </a:p>
+          <a:p>
+            <a:pPr lvl="2"/>
+            <a:r>
+              <a:rPr lang="en-US" dirty="0"/>
+              <a:t>Validation</a:t>
+            </a:r>
+          </a:p>
+          <a:p>
+            <a:pPr lvl="3"/>
+            <a:r>
+              <a:rPr lang="en-US" dirty="0"/>
+              <a:t>We have the payload (decrypted) here</a:t>
+            </a:r>
+          </a:p>
+          <a:p>
+            <a:pPr lvl="3"/>
+            <a:r>
+              <a:rPr lang="en-US" dirty="0"/>
+              <a:t>Return our user object, what you return in this function stored in </a:t>
+            </a:r>
+            <a:r>
+              <a:rPr lang="en-US" sz="2300" dirty="0" err="1">
+                <a:latin typeface="Consolas" panose="020B0609020204030204" pitchFamily="49" charset="0"/>
+              </a:rPr>
+              <a:t>req.user</a:t>
+            </a:r>
+            <a:endParaRPr lang="en-US" sz="2300" dirty="0">
+              <a:latin typeface="Consolas" panose="020B0609020204030204" pitchFamily="49" charset="0"/>
+            </a:endParaRPr>
+          </a:p>
+          <a:p>
+            <a:pPr lvl="2"/>
+            <a:r>
+              <a:rPr lang="en-US" dirty="0"/>
+              <a:t>Don’t forget to provide your new </a:t>
+            </a:r>
+            <a:r>
+              <a:rPr lang="en-US" dirty="0" err="1">
+                <a:latin typeface="Consolas" panose="020B0609020204030204" pitchFamily="49" charset="0"/>
+              </a:rPr>
+              <a:t>JwtStrategy</a:t>
+            </a:r>
+            <a:endParaRPr lang="en-US" dirty="0">
+              <a:latin typeface="Consolas" panose="020B0609020204030204" pitchFamily="49" charset="0"/>
+            </a:endParaRPr>
+          </a:p>
+        </p:txBody>
+      </p:sp>
+      <p:sp>
+        <p:nvSpPr>
+          <p:cNvPr id="4" name="Footer Placeholder 3">
+            <a:extLst>
+              <a:ext uri="{FF2B5EF4-FFF2-40B4-BE49-F238E27FC236}">
+                <a16:creationId xmlns:a16="http://schemas.microsoft.com/office/drawing/2014/main" id="{FE3C4929-EAED-49AB-BB05-437E2B1FC331}"/>
+              </a:ext>
+            </a:extLst>
+          </p:cNvPr>
+          <p:cNvSpPr>
+            <a:spLocks noGrp="1"/>
+          </p:cNvSpPr>
+          <p:nvPr>
+            <p:ph type="ftr" sz="quarter" idx="11"/>
+          </p:nvPr>
+        </p:nvSpPr>
+        <p:spPr/>
+        <p:txBody>
+          <a:bodyPr/>
+          <a:lstStyle/>
+          <a:p>
+            <a:r>
+              <a:rPr lang="en-US"/>
+              <a:t>Nodejs Basics</a:t>
+            </a:r>
+            <a:endParaRPr lang="en-US" dirty="0"/>
+          </a:p>
+        </p:txBody>
+      </p:sp>
+      <p:sp>
+        <p:nvSpPr>
+          <p:cNvPr id="5" name="Slide Number Placeholder 4">
+            <a:extLst>
+              <a:ext uri="{FF2B5EF4-FFF2-40B4-BE49-F238E27FC236}">
+                <a16:creationId xmlns:a16="http://schemas.microsoft.com/office/drawing/2014/main" id="{6EDB6652-B25D-45BC-B7B0-49D958757C31}"/>
+              </a:ext>
+            </a:extLst>
+          </p:cNvPr>
+          <p:cNvSpPr>
+            <a:spLocks noGrp="1"/>
+          </p:cNvSpPr>
+          <p:nvPr>
+            <p:ph type="sldNum" sz="quarter" idx="12"/>
+          </p:nvPr>
+        </p:nvSpPr>
+        <p:spPr/>
+        <p:txBody>
+          <a:bodyPr/>
+          <a:lstStyle/>
+          <a:p>
+            <a:fld id="{3A98EE3D-8CD1-4C3F-BD1C-C98C9596463C}" type="slidenum">
+              <a:rPr lang="en-US" smtClean="0"/>
+              <a:t>12</a:t>
+            </a:fld>
+            <a:endParaRPr lang="en-US" dirty="0"/>
+          </a:p>
+        </p:txBody>
+      </p:sp>
+    </p:spTree>
+    <p:extLst>
+      <p:ext uri="{BB962C8B-B14F-4D97-AF65-F5344CB8AC3E}">
+        <p14:creationId xmlns:p14="http://schemas.microsoft.com/office/powerpoint/2010/main" val="3161835212"/>
+      </p:ext>
+    </p:extLst>
+  </p:cSld>
+  <p:clrMapOvr>
+    <a:masterClrMapping/>
+  </p:clrMapOvr>
+</p:sld>
+</file>
+
+<file path=ppt/slides/slide13.xml><?xml version="1.0" encoding="utf-8"?>
+<p:sld xmlns:a="http://schemas.openxmlformats.org/drawingml/2006/main" xmlns:r="http://schemas.openxmlformats.org/officeDocument/2006/relationships" xmlns:p="http://schemas.openxmlformats.org/presentationml/2006/main">
+  <p:cSld>
+    <p:spTree>
+      <p:nvGrpSpPr>
+        <p:cNvPr id="1" name=""/>
+        <p:cNvGrpSpPr/>
+        <p:nvPr/>
+      </p:nvGrpSpPr>
+      <p:grpSpPr>
+        <a:xfrm>
+          <a:off x="0" y="0"/>
+          <a:ext cx="0" cy="0"/>
+          <a:chOff x="0" y="0"/>
+          <a:chExt cx="0" cy="0"/>
+        </a:xfrm>
+      </p:grpSpPr>
+      <p:sp>
+        <p:nvSpPr>
+          <p:cNvPr id="2" name="Title 1">
+            <a:extLst>
+              <a:ext uri="{FF2B5EF4-FFF2-40B4-BE49-F238E27FC236}">
+                <a16:creationId xmlns:a16="http://schemas.microsoft.com/office/drawing/2014/main" id="{EFC24ED9-0215-4292-9DA9-4EAC6382B23A}"/>
+              </a:ext>
+            </a:extLst>
+          </p:cNvPr>
+          <p:cNvSpPr>
+            <a:spLocks noGrp="1"/>
+          </p:cNvSpPr>
+          <p:nvPr>
+            <p:ph type="title"/>
+          </p:nvPr>
+        </p:nvSpPr>
+        <p:spPr/>
+        <p:txBody>
+          <a:bodyPr/>
+          <a:lstStyle/>
+          <a:p>
+            <a:r>
+              <a:rPr lang="en-US" dirty="0"/>
+              <a:t>RBAC</a:t>
+            </a:r>
+            <a:endParaRPr lang="fa-IR" dirty="0"/>
+          </a:p>
+        </p:txBody>
+      </p:sp>
+      <p:sp>
+        <p:nvSpPr>
+          <p:cNvPr id="3" name="Content Placeholder 2">
+            <a:extLst>
+              <a:ext uri="{FF2B5EF4-FFF2-40B4-BE49-F238E27FC236}">
+                <a16:creationId xmlns:a16="http://schemas.microsoft.com/office/drawing/2014/main" id="{F3B6621D-0ABF-415B-A5D7-FF9017AE4939}"/>
+              </a:ext>
+            </a:extLst>
+          </p:cNvPr>
+          <p:cNvSpPr>
+            <a:spLocks noGrp="1"/>
+          </p:cNvSpPr>
+          <p:nvPr>
+            <p:ph idx="1"/>
+          </p:nvPr>
+        </p:nvSpPr>
+        <p:spPr/>
+        <p:txBody>
+          <a:bodyPr/>
+          <a:lstStyle/>
+          <a:p>
+            <a:r>
+              <a:rPr lang="en-US" dirty="0"/>
+              <a:t>Every user has roles, and by their roles, they can do some stuff.</a:t>
+            </a:r>
+          </a:p>
+          <a:p>
+            <a:r>
+              <a:rPr lang="en-US" dirty="0"/>
+              <a:t>Entity</a:t>
+            </a:r>
+          </a:p>
+          <a:p>
+            <a:pPr lvl="1"/>
+            <a:r>
+              <a:rPr lang="en-US" dirty="0"/>
+              <a:t>User</a:t>
+            </a:r>
+          </a:p>
+          <a:p>
+            <a:pPr lvl="1"/>
+            <a:r>
+              <a:rPr lang="en-US" dirty="0"/>
+              <a:t>Roles</a:t>
+            </a:r>
+          </a:p>
+        </p:txBody>
+      </p:sp>
+      <p:sp>
+        <p:nvSpPr>
+          <p:cNvPr id="4" name="Footer Placeholder 3">
+            <a:extLst>
+              <a:ext uri="{FF2B5EF4-FFF2-40B4-BE49-F238E27FC236}">
+                <a16:creationId xmlns:a16="http://schemas.microsoft.com/office/drawing/2014/main" id="{6BF21FD6-2BAE-483C-850B-B852220F14BC}"/>
+              </a:ext>
+            </a:extLst>
+          </p:cNvPr>
+          <p:cNvSpPr>
+            <a:spLocks noGrp="1"/>
+          </p:cNvSpPr>
+          <p:nvPr>
+            <p:ph type="ftr" sz="quarter" idx="11"/>
+          </p:nvPr>
+        </p:nvSpPr>
+        <p:spPr/>
+        <p:txBody>
+          <a:bodyPr/>
+          <a:lstStyle/>
+          <a:p>
+            <a:r>
+              <a:rPr lang="en-US"/>
+              <a:t>Nodejs Basics</a:t>
+            </a:r>
+            <a:endParaRPr lang="en-US" dirty="0"/>
+          </a:p>
+        </p:txBody>
+      </p:sp>
+      <p:sp>
+        <p:nvSpPr>
+          <p:cNvPr id="5" name="Slide Number Placeholder 4">
+            <a:extLst>
+              <a:ext uri="{FF2B5EF4-FFF2-40B4-BE49-F238E27FC236}">
+                <a16:creationId xmlns:a16="http://schemas.microsoft.com/office/drawing/2014/main" id="{22745D77-598C-4346-912C-728E8A1011A3}"/>
+              </a:ext>
+            </a:extLst>
+          </p:cNvPr>
+          <p:cNvSpPr>
+            <a:spLocks noGrp="1"/>
+          </p:cNvSpPr>
+          <p:nvPr>
+            <p:ph type="sldNum" sz="quarter" idx="12"/>
+          </p:nvPr>
+        </p:nvSpPr>
+        <p:spPr/>
+        <p:txBody>
+          <a:bodyPr/>
+          <a:lstStyle/>
+          <a:p>
+            <a:fld id="{3A98EE3D-8CD1-4C3F-BD1C-C98C9596463C}" type="slidenum">
+              <a:rPr lang="en-US" smtClean="0"/>
+              <a:t>13</a:t>
+            </a:fld>
+            <a:endParaRPr lang="en-US" dirty="0"/>
+          </a:p>
+        </p:txBody>
+      </p:sp>
+      <p:pic>
+        <p:nvPicPr>
+          <p:cNvPr id="6" name="Picture 5">
+            <a:extLst>
+              <a:ext uri="{FF2B5EF4-FFF2-40B4-BE49-F238E27FC236}">
+                <a16:creationId xmlns:a16="http://schemas.microsoft.com/office/drawing/2014/main" id="{7A8C973C-AB2A-438D-A36E-27ACF7687E1F}"/>
+              </a:ext>
+            </a:extLst>
+          </p:cNvPr>
+          <p:cNvPicPr>
+            <a:picLocks noChangeAspect="1"/>
+          </p:cNvPicPr>
+          <p:nvPr/>
+        </p:nvPicPr>
+        <p:blipFill>
+          <a:blip r:embed="rId2"/>
+          <a:stretch>
+            <a:fillRect/>
+          </a:stretch>
+        </p:blipFill>
+        <p:spPr>
+          <a:xfrm>
+            <a:off x="4986681" y="2462777"/>
+            <a:ext cx="4467849" cy="3677163"/>
+          </a:xfrm>
+          <a:prstGeom prst="rect">
+            <a:avLst/>
+          </a:prstGeom>
+        </p:spPr>
+      </p:pic>
+    </p:spTree>
+    <p:extLst>
+      <p:ext uri="{BB962C8B-B14F-4D97-AF65-F5344CB8AC3E}">
+        <p14:creationId xmlns:p14="http://schemas.microsoft.com/office/powerpoint/2010/main" val="1174291724"/>
+      </p:ext>
+    </p:extLst>
+  </p:cSld>
+  <p:clrMapOvr>
+    <a:masterClrMapping/>
+  </p:clrMapOvr>
+</p:sld>
+</file>
+
+<file path=ppt/slides/slide14.xml><?xml version="1.0" encoding="utf-8"?>
+<p:sld xmlns:a="http://schemas.openxmlformats.org/drawingml/2006/main" xmlns:r="http://schemas.openxmlformats.org/officeDocument/2006/relationships" xmlns:p="http://schemas.openxmlformats.org/presentationml/2006/main">
+  <p:cSld>
+    <p:spTree>
+      <p:nvGrpSpPr>
+        <p:cNvPr id="1" name=""/>
+        <p:cNvGrpSpPr/>
+        <p:nvPr/>
+      </p:nvGrpSpPr>
+      <p:grpSpPr>
+        <a:xfrm>
+          <a:off x="0" y="0"/>
+          <a:ext cx="0" cy="0"/>
+          <a:chOff x="0" y="0"/>
+          <a:chExt cx="0" cy="0"/>
+        </a:xfrm>
+      </p:grpSpPr>
+      <p:sp>
+        <p:nvSpPr>
+          <p:cNvPr id="2" name="Title 1">
+            <a:extLst>
+              <a:ext uri="{FF2B5EF4-FFF2-40B4-BE49-F238E27FC236}">
+                <a16:creationId xmlns:a16="http://schemas.microsoft.com/office/drawing/2014/main" id="{302E81C2-C38A-4FF1-8423-9DEED429855D}"/>
+              </a:ext>
+            </a:extLst>
+          </p:cNvPr>
+          <p:cNvSpPr>
+            <a:spLocks noGrp="1"/>
+          </p:cNvSpPr>
+          <p:nvPr>
+            <p:ph type="title"/>
+          </p:nvPr>
+        </p:nvSpPr>
+        <p:spPr/>
+        <p:txBody>
+          <a:bodyPr/>
+          <a:lstStyle/>
+          <a:p>
+            <a:r>
+              <a:rPr lang="en-US" dirty="0"/>
+              <a:t>Demo</a:t>
+            </a:r>
+            <a:endParaRPr lang="fa-IR" dirty="0"/>
+          </a:p>
+        </p:txBody>
+      </p:sp>
+      <p:sp>
+        <p:nvSpPr>
+          <p:cNvPr id="3" name="Content Placeholder 2">
+            <a:extLst>
+              <a:ext uri="{FF2B5EF4-FFF2-40B4-BE49-F238E27FC236}">
+                <a16:creationId xmlns:a16="http://schemas.microsoft.com/office/drawing/2014/main" id="{E7C24035-33B8-46BD-9850-59413176E74B}"/>
+              </a:ext>
+            </a:extLst>
+          </p:cNvPr>
+          <p:cNvSpPr>
+            <a:spLocks noGrp="1"/>
+          </p:cNvSpPr>
+          <p:nvPr>
+            <p:ph idx="1"/>
+          </p:nvPr>
+        </p:nvSpPr>
+        <p:spPr/>
+        <p:txBody>
+          <a:bodyPr/>
+          <a:lstStyle/>
+          <a:p>
+            <a:r>
+              <a:rPr lang="en-US" dirty="0"/>
+              <a:t>Create an </a:t>
+            </a:r>
+            <a:r>
+              <a:rPr lang="en-US" dirty="0" err="1"/>
+              <a:t>enum</a:t>
+            </a:r>
+            <a:r>
+              <a:rPr lang="en-US" dirty="0"/>
+              <a:t> for our roles</a:t>
+            </a:r>
+          </a:p>
+          <a:p>
+            <a:pPr lvl="1"/>
+            <a:r>
+              <a:rPr lang="en-US" dirty="0"/>
+              <a:t>Admin</a:t>
+            </a:r>
+          </a:p>
+          <a:p>
+            <a:pPr lvl="1"/>
+            <a:r>
+              <a:rPr lang="en-US" dirty="0"/>
+              <a:t>Users</a:t>
+            </a:r>
+          </a:p>
+          <a:p>
+            <a:pPr lvl="1"/>
+            <a:r>
+              <a:rPr lang="en-US" dirty="0"/>
+              <a:t>…</a:t>
+            </a:r>
+          </a:p>
+          <a:p>
+            <a:endParaRPr lang="fa-IR" dirty="0"/>
+          </a:p>
+        </p:txBody>
+      </p:sp>
+      <p:sp>
+        <p:nvSpPr>
+          <p:cNvPr id="4" name="Footer Placeholder 3">
+            <a:extLst>
+              <a:ext uri="{FF2B5EF4-FFF2-40B4-BE49-F238E27FC236}">
+                <a16:creationId xmlns:a16="http://schemas.microsoft.com/office/drawing/2014/main" id="{463EBFAF-4FE5-4BEA-82F6-A106140C5607}"/>
+              </a:ext>
+            </a:extLst>
+          </p:cNvPr>
+          <p:cNvSpPr>
+            <a:spLocks noGrp="1"/>
+          </p:cNvSpPr>
+          <p:nvPr>
+            <p:ph type="ftr" sz="quarter" idx="11"/>
+          </p:nvPr>
+        </p:nvSpPr>
+        <p:spPr/>
+        <p:txBody>
+          <a:bodyPr/>
+          <a:lstStyle/>
+          <a:p>
+            <a:r>
+              <a:rPr lang="en-US"/>
+              <a:t>Nodejs Basics</a:t>
+            </a:r>
+            <a:endParaRPr lang="en-US" dirty="0"/>
+          </a:p>
+        </p:txBody>
+      </p:sp>
+      <p:sp>
+        <p:nvSpPr>
+          <p:cNvPr id="5" name="Slide Number Placeholder 4">
+            <a:extLst>
+              <a:ext uri="{FF2B5EF4-FFF2-40B4-BE49-F238E27FC236}">
+                <a16:creationId xmlns:a16="http://schemas.microsoft.com/office/drawing/2014/main" id="{26943732-A3E0-4932-A356-D40AE244C450}"/>
+              </a:ext>
+            </a:extLst>
+          </p:cNvPr>
+          <p:cNvSpPr>
+            <a:spLocks noGrp="1"/>
+          </p:cNvSpPr>
+          <p:nvPr>
+            <p:ph type="sldNum" sz="quarter" idx="12"/>
+          </p:nvPr>
+        </p:nvSpPr>
+        <p:spPr/>
+        <p:txBody>
+          <a:bodyPr/>
+          <a:lstStyle/>
+          <a:p>
+            <a:fld id="{3A98EE3D-8CD1-4C3F-BD1C-C98C9596463C}" type="slidenum">
+              <a:rPr lang="en-US" smtClean="0"/>
+              <a:t>14</a:t>
+            </a:fld>
+            <a:endParaRPr lang="en-US" dirty="0"/>
+          </a:p>
+        </p:txBody>
+      </p:sp>
+    </p:spTree>
+    <p:extLst>
+      <p:ext uri="{BB962C8B-B14F-4D97-AF65-F5344CB8AC3E}">
+        <p14:creationId xmlns:p14="http://schemas.microsoft.com/office/powerpoint/2010/main" val="2295803702"/>
+      </p:ext>
+    </p:extLst>
+  </p:cSld>
+  <p:clrMapOvr>
+    <a:masterClrMapping/>
+  </p:clrMapOvr>
+</p:sld>
+</file>
+
+<file path=ppt/slides/slide15.xml><?xml version="1.0" encoding="utf-8"?>
+<p:sld xmlns:a="http://schemas.openxmlformats.org/drawingml/2006/main" xmlns:r="http://schemas.openxmlformats.org/officeDocument/2006/relationships" xmlns:p="http://schemas.openxmlformats.org/presentationml/2006/main">
+  <p:cSld>
+    <p:spTree>
+      <p:nvGrpSpPr>
+        <p:cNvPr id="1" name=""/>
+        <p:cNvGrpSpPr/>
+        <p:nvPr/>
+      </p:nvGrpSpPr>
+      <p:grpSpPr>
+        <a:xfrm>
+          <a:off x="0" y="0"/>
+          <a:ext cx="0" cy="0"/>
+          <a:chOff x="0" y="0"/>
+          <a:chExt cx="0" cy="0"/>
+        </a:xfrm>
+      </p:grpSpPr>
+      <p:sp>
+        <p:nvSpPr>
+          <p:cNvPr id="2" name="Title 1">
+            <a:extLst>
+              <a:ext uri="{FF2B5EF4-FFF2-40B4-BE49-F238E27FC236}">
+                <a16:creationId xmlns:a16="http://schemas.microsoft.com/office/drawing/2014/main" id="{8CDDCA58-244A-4CD0-9B44-357D1BC5F127}"/>
+              </a:ext>
+            </a:extLst>
+          </p:cNvPr>
+          <p:cNvSpPr>
+            <a:spLocks noGrp="1"/>
+          </p:cNvSpPr>
+          <p:nvPr>
+            <p:ph type="title"/>
+          </p:nvPr>
+        </p:nvSpPr>
+        <p:spPr/>
+        <p:txBody>
+          <a:bodyPr/>
+          <a:lstStyle/>
+          <a:p>
+            <a:r>
+              <a:rPr lang="en-US" dirty="0"/>
+              <a:t>Demo</a:t>
+            </a:r>
+            <a:endParaRPr lang="fa-IR" dirty="0"/>
+          </a:p>
+        </p:txBody>
+      </p:sp>
+      <p:sp>
+        <p:nvSpPr>
+          <p:cNvPr id="3" name="Content Placeholder 2">
+            <a:extLst>
+              <a:ext uri="{FF2B5EF4-FFF2-40B4-BE49-F238E27FC236}">
+                <a16:creationId xmlns:a16="http://schemas.microsoft.com/office/drawing/2014/main" id="{21B7E033-0514-444E-96F6-4BE5B57AFB1A}"/>
+              </a:ext>
+            </a:extLst>
+          </p:cNvPr>
+          <p:cNvSpPr>
+            <a:spLocks noGrp="1"/>
+          </p:cNvSpPr>
+          <p:nvPr>
+            <p:ph idx="1"/>
+          </p:nvPr>
+        </p:nvSpPr>
+        <p:spPr/>
+        <p:txBody>
+          <a:bodyPr/>
+          <a:lstStyle/>
+          <a:p>
+            <a:r>
+              <a:rPr lang="en-US" dirty="0"/>
+              <a:t>Add metadata to routes</a:t>
+            </a:r>
+          </a:p>
+          <a:p>
+            <a:pPr lvl="1"/>
+            <a:r>
+              <a:rPr lang="en-US" dirty="0" err="1"/>
+              <a:t>SetMetadata</a:t>
+            </a:r>
+            <a:r>
+              <a:rPr lang="en-US" dirty="0"/>
+              <a:t>(key, value)</a:t>
+            </a:r>
+          </a:p>
+          <a:p>
+            <a:r>
+              <a:rPr lang="en-US" dirty="0"/>
+              <a:t>Check user against this metadata through guards</a:t>
+            </a:r>
+          </a:p>
+          <a:p>
+            <a:pPr lvl="1"/>
+            <a:r>
+              <a:rPr lang="en-US" dirty="0" err="1"/>
+              <a:t>RolesGuard</a:t>
+            </a:r>
+            <a:r>
+              <a:rPr lang="en-US" dirty="0"/>
+              <a:t> extends </a:t>
+            </a:r>
+            <a:r>
+              <a:rPr lang="en-US" dirty="0" err="1"/>
+              <a:t>CanActivate</a:t>
+            </a:r>
+            <a:endParaRPr lang="en-US" dirty="0"/>
+          </a:p>
+          <a:p>
+            <a:pPr lvl="1"/>
+            <a:r>
+              <a:rPr lang="en-US" dirty="0"/>
+              <a:t>Extract metadata with reflect module</a:t>
+            </a:r>
+          </a:p>
+          <a:p>
+            <a:pPr lvl="1"/>
+            <a:r>
+              <a:rPr lang="en-US" dirty="0"/>
+              <a:t>Does this user is authorized for this role?</a:t>
+            </a:r>
+          </a:p>
+          <a:p>
+            <a:pPr lvl="2"/>
+            <a:r>
+              <a:rPr lang="en-US" dirty="0"/>
+              <a:t>We can extract user from request.</a:t>
+            </a:r>
+          </a:p>
+          <a:p>
+            <a:pPr lvl="1"/>
+            <a:r>
+              <a:rPr lang="en-US" dirty="0"/>
+              <a:t>Finally: </a:t>
+            </a:r>
+            <a:r>
+              <a:rPr lang="en-US" dirty="0" err="1"/>
+              <a:t>roles.some</a:t>
+            </a:r>
+            <a:r>
+              <a:rPr lang="en-US" dirty="0"/>
+              <a:t>(</a:t>
+            </a:r>
+            <a:r>
+              <a:rPr lang="en-US" dirty="0" err="1"/>
+              <a:t>ourExctractedUser.roles.include</a:t>
+            </a:r>
+            <a:r>
+              <a:rPr lang="en-US" dirty="0"/>
+              <a:t>(the-route-role))</a:t>
+            </a:r>
+          </a:p>
+          <a:p>
+            <a:pPr lvl="1"/>
+            <a:r>
+              <a:rPr lang="en-US" dirty="0"/>
+              <a:t>Don’t forget to let it pass if the metadata for roles is empty </a:t>
+            </a:r>
+            <a:r>
+              <a:rPr lang="en-US" dirty="0">
+                <a:sym typeface="Wingdings" panose="05000000000000000000" pitchFamily="2" charset="2"/>
+              </a:rPr>
+              <a:t></a:t>
+            </a:r>
+            <a:endParaRPr lang="fa-IR" dirty="0"/>
+          </a:p>
+        </p:txBody>
+      </p:sp>
+      <p:sp>
+        <p:nvSpPr>
+          <p:cNvPr id="4" name="Footer Placeholder 3">
+            <a:extLst>
+              <a:ext uri="{FF2B5EF4-FFF2-40B4-BE49-F238E27FC236}">
+                <a16:creationId xmlns:a16="http://schemas.microsoft.com/office/drawing/2014/main" id="{AC2988CF-B00E-4578-89B1-7D022879E24E}"/>
+              </a:ext>
+            </a:extLst>
+          </p:cNvPr>
+          <p:cNvSpPr>
+            <a:spLocks noGrp="1"/>
+          </p:cNvSpPr>
+          <p:nvPr>
+            <p:ph type="ftr" sz="quarter" idx="11"/>
+          </p:nvPr>
+        </p:nvSpPr>
+        <p:spPr/>
+        <p:txBody>
+          <a:bodyPr/>
+          <a:lstStyle/>
+          <a:p>
+            <a:r>
+              <a:rPr lang="en-US"/>
+              <a:t>Nodejs Basics</a:t>
+            </a:r>
+            <a:endParaRPr lang="en-US" dirty="0"/>
+          </a:p>
+        </p:txBody>
+      </p:sp>
+      <p:sp>
+        <p:nvSpPr>
+          <p:cNvPr id="5" name="Slide Number Placeholder 4">
+            <a:extLst>
+              <a:ext uri="{FF2B5EF4-FFF2-40B4-BE49-F238E27FC236}">
+                <a16:creationId xmlns:a16="http://schemas.microsoft.com/office/drawing/2014/main" id="{3A1DF273-2775-4FC0-9155-6891F09D0114}"/>
+              </a:ext>
+            </a:extLst>
+          </p:cNvPr>
+          <p:cNvSpPr>
+            <a:spLocks noGrp="1"/>
+          </p:cNvSpPr>
+          <p:nvPr>
+            <p:ph type="sldNum" sz="quarter" idx="12"/>
+          </p:nvPr>
+        </p:nvSpPr>
+        <p:spPr/>
+        <p:txBody>
+          <a:bodyPr/>
+          <a:lstStyle/>
+          <a:p>
+            <a:fld id="{3A98EE3D-8CD1-4C3F-BD1C-C98C9596463C}" type="slidenum">
+              <a:rPr lang="en-US" smtClean="0"/>
+              <a:t>15</a:t>
+            </a:fld>
+            <a:endParaRPr lang="en-US" dirty="0"/>
+          </a:p>
+        </p:txBody>
+      </p:sp>
+    </p:spTree>
+    <p:extLst>
+      <p:ext uri="{BB962C8B-B14F-4D97-AF65-F5344CB8AC3E}">
+        <p14:creationId xmlns:p14="http://schemas.microsoft.com/office/powerpoint/2010/main" val="1342545384"/>
+      </p:ext>
+    </p:extLst>
+  </p:cSld>
+  <p:clrMapOvr>
+    <a:masterClrMapping/>
+  </p:clrMapOvr>
+</p:sld>
+</file>
+
+<file path=ppt/slides/slide16.xml><?xml version="1.0" encoding="utf-8"?>
+<p:sld xmlns:a="http://schemas.openxmlformats.org/drawingml/2006/main" xmlns:r="http://schemas.openxmlformats.org/officeDocument/2006/relationships" xmlns:p="http://schemas.openxmlformats.org/presentationml/2006/main">
+  <p:cSld>
+    <p:spTree>
+      <p:nvGrpSpPr>
+        <p:cNvPr id="1" name=""/>
+        <p:cNvGrpSpPr/>
+        <p:nvPr/>
+      </p:nvGrpSpPr>
+      <p:grpSpPr>
+        <a:xfrm>
+          <a:off x="0" y="0"/>
+          <a:ext cx="0" cy="0"/>
+          <a:chOff x="0" y="0"/>
+          <a:chExt cx="0" cy="0"/>
+        </a:xfrm>
+      </p:grpSpPr>
+      <p:sp>
+        <p:nvSpPr>
+          <p:cNvPr id="2" name="Title 1">
+            <a:extLst>
+              <a:ext uri="{FF2B5EF4-FFF2-40B4-BE49-F238E27FC236}">
                 <a16:creationId xmlns:a16="http://schemas.microsoft.com/office/drawing/2014/main" id="{6B1A0672-14A7-4501-900C-A98EBCCF7AFE}"/>
               </a:ext>
             </a:extLst>
@@ -7596,6 +8461,20 @@
             </a:r>
           </a:p>
           <a:p>
+            <a:pPr lvl="1"/>
+            <a:r>
+              <a:rPr lang="en-US" dirty="0"/>
+              <a:t>Do some authorization </a:t>
+            </a:r>
+            <a:r>
+              <a:rPr lang="en-US" dirty="0">
+                <a:sym typeface="Wingdings" panose="05000000000000000000" pitchFamily="2" charset="2"/>
+              </a:rPr>
+              <a:t></a:t>
+            </a:r>
+            <a:endParaRPr lang="en-US" dirty="0"/>
+          </a:p>
+          <a:p>
             <a:r>
               <a:rPr lang="en-US" dirty="0"/>
               <a:t>Optional:</a:t>
@@ -7669,7 +8548,7 @@
           <a:p>
             <a:fld id="{3A98EE3D-8CD1-4C3F-BD1C-C98C9596463C}" type="slidenum">
               <a:rPr lang="en-US" smtClean="0"/>
-              <a:t>12</a:t>
+              <a:t>16</a:t>
             </a:fld>
             <a:endParaRPr lang="en-US" dirty="0"/>
           </a:p>
@@ -7798,6 +8677,38 @@
               <a:t>JWT Strategy</a:t>
             </a:r>
           </a:p>
+          <a:p>
+            <a:r>
+              <a:rPr lang="en-US" dirty="0">
+                <a:solidFill>
+                  <a:schemeClr val="tx1"/>
+                </a:solidFill>
+              </a:rPr>
+              <a:t>Authorization</a:t>
+            </a:r>
+          </a:p>
+          <a:p>
+            <a:pPr lvl="1"/>
+            <a:r>
+              <a:rPr lang="en-US" dirty="0">
+                <a:solidFill>
+                  <a:schemeClr val="tx1"/>
+                </a:solidFill>
+              </a:rPr>
+              <a:t>What is role? What is RBAC?</a:t>
+            </a:r>
+          </a:p>
+          <a:p>
+            <a:pPr lvl="1"/>
+            <a:r>
+              <a:rPr lang="en-US" dirty="0">
+                <a:solidFill>
+                  <a:schemeClr val="tx1"/>
+                </a:solidFill>
+              </a:rPr>
+              <a:t>Create guard for authorization purposes</a:t>
+            </a:r>
+          </a:p>
         </p:txBody>
       </p:sp>
       <p:sp>
@@ -8172,7 +9083,7 @@
         </p:spPr>
         <p:txBody>
           <a:bodyPr>
-            <a:normAutofit fontScale="92500"/>
+            <a:normAutofit fontScale="92500" lnSpcReduction="10000"/>
           </a:bodyPr>
           <a:lstStyle/>
           <a:p>
@@ -8206,14 +9117,45 @@
             <a:endParaRPr lang="fa-IR" dirty="0"/>
           </a:p>
           <a:p>
-            <a:pPr lvl="1"/>
-            <a:r>
-              <a:rPr lang="en-US" dirty="0" err="1"/>
+            <a:pPr lvl="2"/>
+            <a:r>
+              <a:rPr lang="en-US" dirty="0" err="1">
+                <a:latin typeface="Consolas" panose="020B0609020204030204" pitchFamily="49" charset="0"/>
+              </a:rPr>
               <a:t>npm</a:t>
             </a:r>
             <a:r>
-              <a:rPr lang="en-US" dirty="0"/>
+              <a:rPr lang="en-US" dirty="0">
+                <a:latin typeface="Consolas" panose="020B0609020204030204" pitchFamily="49" charset="0"/>
+              </a:rPr>
               <a:t> install express-session</a:t>
+            </a:r>
+          </a:p>
+          <a:p>
+            <a:pPr lvl="2"/>
+            <a:r>
+              <a:rPr lang="en-US" dirty="0" err="1">
+                <a:latin typeface="Consolas" panose="020B0609020204030204" pitchFamily="49" charset="0"/>
+              </a:rPr>
+              <a:t>npm</a:t>
+            </a:r>
+            <a:r>
+              <a:rPr lang="en-US" dirty="0">
+                <a:latin typeface="Consolas" panose="020B0609020204030204" pitchFamily="49" charset="0"/>
+              </a:rPr>
+              <a:t> </a:t>
+            </a:r>
+            <a:r>
+              <a:rPr lang="en-US" dirty="0" err="1">
+                <a:latin typeface="Consolas" panose="020B0609020204030204" pitchFamily="49" charset="0"/>
+              </a:rPr>
+              <a:t>i</a:t>
+            </a:r>
+            <a:r>
+              <a:rPr lang="en-US" dirty="0">
+                <a:latin typeface="Consolas" panose="020B0609020204030204" pitchFamily="49" charset="0"/>
+              </a:rPr>
+              <a:t> -D @types/express-session</a:t>
             </a:r>
           </a:p>
           <a:p>
@@ -8241,76 +9183,110 @@
           <a:p>
             <a:pPr lvl="2"/>
             <a:r>
-              <a:rPr lang="en-US" dirty="0" err="1"/>
+              <a:rPr lang="en-US" dirty="0" err="1">
+                <a:latin typeface="Consolas" panose="020B0609020204030204" pitchFamily="49" charset="0"/>
+              </a:rPr>
               <a:t>app.use</a:t>
             </a:r>
             <a:r>
-              <a:rPr lang="en-US" dirty="0"/>
+              <a:rPr lang="en-US" dirty="0">
+                <a:latin typeface="Consolas" panose="020B0609020204030204" pitchFamily="49" charset="0"/>
+              </a:rPr>
               <a:t>(session({</a:t>
             </a:r>
-            <a:endParaRPr lang="fa-IR" dirty="0"/>
+            <a:endParaRPr lang="fa-IR" dirty="0">
+              <a:latin typeface="Consolas" panose="020B0609020204030204" pitchFamily="49" charset="0"/>
+            </a:endParaRPr>
           </a:p>
           <a:p>
             <a:pPr lvl="3"/>
             <a:r>
-              <a:rPr lang="en-US" dirty="0"/>
+              <a:rPr lang="en-US" dirty="0">
+                <a:latin typeface="Consolas" panose="020B0609020204030204" pitchFamily="49" charset="0"/>
+              </a:rPr>
               <a:t>secret, resave, </a:t>
             </a:r>
             <a:r>
-              <a:rPr lang="en-US" dirty="0" err="1"/>
+              <a:rPr lang="en-US" dirty="0" err="1">
+                <a:latin typeface="Consolas" panose="020B0609020204030204" pitchFamily="49" charset="0"/>
+              </a:rPr>
               <a:t>saveUninitialized</a:t>
             </a:r>
             <a:r>
-              <a:rPr lang="en-US" dirty="0"/>
+              <a:rPr lang="en-US" dirty="0">
+                <a:latin typeface="Consolas" panose="020B0609020204030204" pitchFamily="49" charset="0"/>
+              </a:rPr>
               <a:t>, cookie :{}</a:t>
             </a:r>
-            <a:endParaRPr lang="fa-IR" dirty="0"/>
+            <a:endParaRPr lang="fa-IR" dirty="0">
+              <a:latin typeface="Consolas" panose="020B0609020204030204" pitchFamily="49" charset="0"/>
+            </a:endParaRPr>
           </a:p>
           <a:p>
             <a:pPr lvl="2"/>
             <a:r>
-              <a:rPr lang="en-US" dirty="0"/>
+              <a:rPr lang="en-US" dirty="0">
+                <a:latin typeface="Consolas" panose="020B0609020204030204" pitchFamily="49" charset="0"/>
+              </a:rPr>
               <a:t>}));</a:t>
             </a:r>
           </a:p>
           <a:p>
             <a:pPr lvl="2"/>
             <a:r>
-              <a:rPr lang="en-US" dirty="0" err="1"/>
+              <a:rPr lang="en-US" dirty="0" err="1">
+                <a:latin typeface="Consolas" panose="020B0609020204030204" pitchFamily="49" charset="0"/>
+              </a:rPr>
               <a:t>app.use</a:t>
             </a:r>
             <a:r>
-              <a:rPr lang="en-US" dirty="0"/>
+              <a:rPr lang="en-US" dirty="0">
+                <a:latin typeface="Consolas" panose="020B0609020204030204" pitchFamily="49" charset="0"/>
+              </a:rPr>
               <a:t>(</a:t>
             </a:r>
             <a:r>
-              <a:rPr lang="en-US" dirty="0" err="1"/>
+              <a:rPr lang="en-US" dirty="0" err="1">
+                <a:latin typeface="Consolas" panose="020B0609020204030204" pitchFamily="49" charset="0"/>
+              </a:rPr>
               <a:t>passport.initialize</a:t>
             </a:r>
             <a:r>
-              <a:rPr lang="en-US" dirty="0"/>
+              <a:rPr lang="en-US" dirty="0">
+                <a:latin typeface="Consolas" panose="020B0609020204030204" pitchFamily="49" charset="0"/>
+              </a:rPr>
               <a:t>());</a:t>
             </a:r>
           </a:p>
           <a:p>
             <a:pPr lvl="2"/>
             <a:r>
-              <a:rPr lang="en-US" dirty="0" err="1"/>
+              <a:rPr lang="en-US" dirty="0" err="1">
+                <a:latin typeface="Consolas" panose="020B0609020204030204" pitchFamily="49" charset="0"/>
+              </a:rPr>
               <a:t>app.use</a:t>
             </a:r>
             <a:r>
-              <a:rPr lang="en-US" dirty="0"/>
+              <a:rPr lang="en-US" dirty="0">
+                <a:latin typeface="Consolas" panose="020B0609020204030204" pitchFamily="49" charset="0"/>
+              </a:rPr>
               <a:t>(</a:t>
             </a:r>
             <a:r>
-              <a:rPr lang="en-US" dirty="0" err="1"/>
+              <a:rPr lang="en-US" dirty="0" err="1">
+                <a:latin typeface="Consolas" panose="020B0609020204030204" pitchFamily="49" charset="0"/>
+              </a:rPr>
               <a:t>passport.session</a:t>
             </a:r>
             <a:r>
-              <a:rPr lang="en-US" dirty="0"/>
+              <a:rPr lang="en-US" dirty="0">
+                <a:latin typeface="Consolas" panose="020B0609020204030204" pitchFamily="49" charset="0"/>
+              </a:rPr>
               <a:t>());</a:t>
             </a:r>
-            <a:endParaRPr lang="fa-IR" dirty="0"/>
+            <a:endParaRPr lang="fa-IR" dirty="0">
+              <a:latin typeface="Consolas" panose="020B0609020204030204" pitchFamily="49" charset="0"/>
+            </a:endParaRPr>
           </a:p>
           <a:p>
             <a:pPr lvl="1"/>
@@ -8474,97 +9450,128 @@
               <a:t>Extends </a:t>
             </a:r>
             <a:r>
+              <a:rPr lang="en-US" dirty="0" err="1">
+                <a:latin typeface="Consolas" panose="020B0609020204030204" pitchFamily="49" charset="0"/>
+              </a:rPr>
+              <a:t>PassportSerializer</a:t>
+            </a:r>
+            <a:endParaRPr lang="en-US" dirty="0">
+              <a:latin typeface="Consolas" panose="020B0609020204030204" pitchFamily="49" charset="0"/>
+            </a:endParaRPr>
+          </a:p>
+          <a:p>
+            <a:pPr lvl="2"/>
+            <a:r>
+              <a:rPr lang="en-US" dirty="0" err="1">
+                <a:latin typeface="Consolas" panose="020B0609020204030204" pitchFamily="49" charset="0"/>
+              </a:rPr>
+              <a:t>serializeUser</a:t>
+            </a:r>
+            <a:r>
+              <a:rPr lang="en-US" dirty="0">
+                <a:latin typeface="Consolas" panose="020B0609020204030204" pitchFamily="49" charset="0"/>
+              </a:rPr>
+              <a:t>()</a:t>
+            </a:r>
+          </a:p>
+          <a:p>
+            <a:pPr lvl="2"/>
+            <a:r>
+              <a:rPr lang="en-US" dirty="0" err="1">
+                <a:latin typeface="Consolas" panose="020B0609020204030204" pitchFamily="49" charset="0"/>
+              </a:rPr>
+              <a:t>deserializeUser</a:t>
+            </a:r>
+            <a:r>
+              <a:rPr lang="en-US" dirty="0">
+                <a:latin typeface="Consolas" panose="020B0609020204030204" pitchFamily="49" charset="0"/>
+              </a:rPr>
+              <a:t>()</a:t>
+            </a:r>
+          </a:p>
+          <a:p>
+            <a:pPr lvl="2"/>
+            <a:r>
+              <a:rPr lang="en-US" dirty="0"/>
+              <a:t>Implementation of this two method is up to you</a:t>
+            </a:r>
+          </a:p>
+          <a:p>
+            <a:pPr lvl="1"/>
+            <a:r>
+              <a:rPr lang="en-US" dirty="0"/>
+              <a:t>Don’t forget to Provide the serializer in your </a:t>
+            </a:r>
+            <a:r>
               <a:rPr lang="en-US" dirty="0" err="1"/>
-              <a:t>PassportSerializer</a:t>
-            </a:r>
-            <a:endParaRPr lang="en-US" dirty="0"/>
-          </a:p>
-          <a:p>
-            <a:pPr lvl="2"/>
-            <a:r>
-              <a:rPr lang="en-US" dirty="0" err="1"/>
-              <a:t>serializeUser</a:t>
-            </a:r>
-            <a:r>
-              <a:rPr lang="en-US" dirty="0"/>
-              <a:t>()</a:t>
-            </a:r>
-          </a:p>
-          <a:p>
-            <a:pPr lvl="2"/>
-            <a:r>
-              <a:rPr lang="en-US" dirty="0" err="1"/>
-              <a:t>deserializeUser</a:t>
-            </a:r>
-            <a:r>
-              <a:rPr lang="en-US" dirty="0"/>
-              <a:t>()</a:t>
-            </a:r>
-          </a:p>
-          <a:p>
-            <a:pPr lvl="2"/>
-            <a:r>
-              <a:rPr lang="en-US" dirty="0"/>
-              <a:t>Implementation of this two method is up to you</a:t>
-            </a:r>
+              <a:t>AuthModule</a:t>
+            </a:r>
+            <a:endParaRPr lang="en-US" dirty="0"/>
           </a:p>
           <a:p>
             <a:pPr lvl="1"/>
             <a:r>
-              <a:rPr lang="en-US" dirty="0"/>
-              <a:t>Provide the serializer</a:t>
+              <a:rPr lang="en-US" dirty="0" err="1">
+                <a:latin typeface="Consolas" panose="020B0609020204030204" pitchFamily="49" charset="0"/>
+              </a:rPr>
+              <a:t>PassportModule.register</a:t>
+            </a:r>
+            <a:r>
+              <a:rPr lang="en-US" dirty="0">
+                <a:latin typeface="Consolas" panose="020B0609020204030204" pitchFamily="49" charset="0"/>
+              </a:rPr>
+              <a:t>({ session: true })</a:t>
             </a:r>
           </a:p>
           <a:p>
             <a:pPr lvl="1"/>
             <a:r>
-              <a:rPr lang="en-US" dirty="0" err="1"/>
-              <a:t>PassportModule.register</a:t>
-            </a:r>
-            <a:r>
-              <a:rPr lang="en-US" dirty="0"/>
-              <a:t>({ session: true })</a:t>
+              <a:rPr lang="en-US" dirty="0"/>
+              <a:t>In </a:t>
+            </a:r>
+            <a:r>
+              <a:rPr lang="en-US" dirty="0" err="1">
+                <a:latin typeface="Consolas" panose="020B0609020204030204" pitchFamily="49" charset="0"/>
+              </a:rPr>
+              <a:t>LocalAuthGuard</a:t>
+            </a:r>
+            <a:r>
+              <a:rPr lang="en-US" dirty="0"/>
+              <a:t> add some custom </a:t>
+            </a:r>
+            <a:r>
+              <a:rPr lang="en-US" dirty="0" err="1">
+                <a:latin typeface="Consolas" panose="020B0609020204030204" pitchFamily="49" charset="0"/>
+              </a:rPr>
+              <a:t>canActivate</a:t>
+            </a:r>
+            <a:r>
+              <a:rPr lang="en-US" dirty="0"/>
+              <a:t> function that </a:t>
             </a:r>
           </a:p>
           <a:p>
             <a:pPr lvl="1"/>
             <a:r>
-              <a:rPr lang="en-US" dirty="0"/>
-              <a:t>In </a:t>
-            </a:r>
-            <a:r>
-              <a:rPr lang="en-US" dirty="0" err="1"/>
-              <a:t>LocalAuthGuard</a:t>
-            </a:r>
-            <a:r>
-              <a:rPr lang="en-US" dirty="0"/>
-              <a:t> add some custom </a:t>
-            </a:r>
-            <a:r>
-              <a:rPr lang="en-US" dirty="0" err="1"/>
-              <a:t>canActivate</a:t>
-            </a:r>
-            <a:r>
-              <a:rPr lang="en-US" dirty="0"/>
-              <a:t> function that </a:t>
-            </a:r>
-          </a:p>
-          <a:p>
-            <a:pPr lvl="1"/>
-            <a:r>
-              <a:rPr lang="en-US" dirty="0" err="1"/>
-              <a:t>Super.canActivate</a:t>
+              <a:rPr lang="en-US" dirty="0" err="1">
+                <a:latin typeface="Consolas" panose="020B0609020204030204" pitchFamily="49" charset="0"/>
+              </a:rPr>
+              <a:t>super.canActivate</a:t>
             </a:r>
             <a:r>
               <a:rPr lang="en-US" dirty="0"/>
               <a:t>, </a:t>
             </a:r>
             <a:r>
-              <a:rPr lang="en-US" dirty="0" err="1"/>
+              <a:rPr lang="en-US" dirty="0" err="1">
+                <a:latin typeface="Consolas" panose="020B0609020204030204" pitchFamily="49" charset="0"/>
+              </a:rPr>
               <a:t>super.login</a:t>
             </a:r>
             <a:r>
-              <a:rPr lang="en-US" dirty="0"/>
+              <a:rPr lang="en-US" dirty="0">
+                <a:latin typeface="Consolas" panose="020B0609020204030204" pitchFamily="49" charset="0"/>
+              </a:rPr>
               <a:t>()</a:t>
             </a:r>
           </a:p>

</xml_diff>